<commit_message>
update for 2018/12/20 Meeting
</commit_message>
<xml_diff>
--- a/oouchi/1.2_LogisticRegression/1.2_RogisticRegression.pptx
+++ b/oouchi/1.2_LogisticRegression/1.2_RogisticRegression.pptx
@@ -16,13 +16,13 @@
     <p:sldId id="262" r:id="rId7"/>
     <p:sldId id="263" r:id="rId8"/>
     <p:sldId id="264" r:id="rId9"/>
-    <p:sldId id="265" r:id="rId10"/>
-    <p:sldId id="276" r:id="rId11"/>
-    <p:sldId id="266" r:id="rId12"/>
-    <p:sldId id="273" r:id="rId13"/>
-    <p:sldId id="274" r:id="rId14"/>
-    <p:sldId id="269" r:id="rId15"/>
-    <p:sldId id="270" r:id="rId16"/>
+    <p:sldId id="270" r:id="rId10"/>
+    <p:sldId id="269" r:id="rId11"/>
+    <p:sldId id="265" r:id="rId12"/>
+    <p:sldId id="276" r:id="rId13"/>
+    <p:sldId id="266" r:id="rId14"/>
+    <p:sldId id="273" r:id="rId15"/>
+    <p:sldId id="274" r:id="rId16"/>
   </p:sldIdLst>
   <p:sldSz cx="9144000" cy="6858000" type="screen4x3"/>
   <p:notesSz cx="6858000" cy="9144000"/>
@@ -222,7 +222,7 @@
           <a:p>
             <a:fld id="{35AF1AB0-152F-4944-8B0B-D6AC80456478}" type="datetimeFigureOut">
               <a:rPr kumimoji="1" lang="ja-JP" altLang="en-US" smtClean="0"/>
-              <a:t>2018/11/28</a:t>
+              <a:t>2018/12/7</a:t>
             </a:fld>
             <a:endParaRPr kumimoji="1" lang="ja-JP" altLang="en-US"/>
           </a:p>
@@ -709,7 +709,7 @@
           <a:p>
             <a:fld id="{9162DFDF-7161-450E-AA25-87B734D9927A}" type="datetime1">
               <a:rPr kumimoji="1" lang="ja-JP" altLang="en-US" smtClean="0"/>
-              <a:t>2018/11/28</a:t>
+              <a:t>2018/12/7</a:t>
             </a:fld>
             <a:endParaRPr kumimoji="1" lang="ja-JP" altLang="en-US"/>
           </a:p>
@@ -941,7 +941,7 @@
           <a:p>
             <a:fld id="{05170B31-FCB0-4503-B8DD-4901361C2F6F}" type="datetime1">
               <a:rPr kumimoji="1" lang="ja-JP" altLang="en-US" smtClean="0"/>
-              <a:t>2018/11/28</a:t>
+              <a:t>2018/12/7</a:t>
             </a:fld>
             <a:endParaRPr kumimoji="1" lang="ja-JP" altLang="en-US"/>
           </a:p>
@@ -1148,7 +1148,7 @@
           <a:p>
             <a:fld id="{A285A42D-9368-4BB8-90BE-0F899494FD93}" type="datetime1">
               <a:rPr kumimoji="1" lang="ja-JP" altLang="en-US" smtClean="0"/>
-              <a:t>2018/11/28</a:t>
+              <a:t>2018/12/7</a:t>
             </a:fld>
             <a:endParaRPr kumimoji="1" lang="ja-JP" altLang="en-US"/>
           </a:p>
@@ -1345,7 +1345,7 @@
           <a:p>
             <a:fld id="{AC56DD09-0C5E-431E-AADA-074A2AD145DD}" type="datetime1">
               <a:rPr kumimoji="1" lang="ja-JP" altLang="en-US" smtClean="0"/>
-              <a:t>2018/11/28</a:t>
+              <a:t>2018/12/7</a:t>
             </a:fld>
             <a:endParaRPr kumimoji="1" lang="ja-JP" altLang="en-US"/>
           </a:p>
@@ -1593,7 +1593,7 @@
           <a:p>
             <a:fld id="{E3F455DD-B8CA-4C30-97FD-952368997C4F}" type="datetime1">
               <a:rPr kumimoji="1" lang="ja-JP" altLang="en-US" smtClean="0"/>
-              <a:t>2018/11/28</a:t>
+              <a:t>2018/12/7</a:t>
             </a:fld>
             <a:endParaRPr kumimoji="1" lang="ja-JP" altLang="en-US"/>
           </a:p>
@@ -1975,7 +1975,7 @@
           <a:p>
             <a:fld id="{6AD42BE7-B330-4BC3-BB4C-EE0029A16A41}" type="datetime1">
               <a:rPr kumimoji="1" lang="ja-JP" altLang="en-US" smtClean="0"/>
-              <a:t>2018/11/28</a:t>
+              <a:t>2018/12/7</a:t>
             </a:fld>
             <a:endParaRPr kumimoji="1" lang="ja-JP" altLang="en-US"/>
           </a:p>
@@ -2505,7 +2505,7 @@
           <a:p>
             <a:fld id="{68A324F7-1AF9-496C-9147-148D735ACB58}" type="datetime1">
               <a:rPr kumimoji="1" lang="ja-JP" altLang="en-US" smtClean="0"/>
-              <a:t>2018/11/28</a:t>
+              <a:t>2018/12/7</a:t>
             </a:fld>
             <a:endParaRPr kumimoji="1" lang="ja-JP" altLang="en-US"/>
           </a:p>
@@ -2653,7 +2653,7 @@
           <a:p>
             <a:fld id="{27AA0BA3-AB01-4609-88A0-55AAC0CC76BD}" type="datetime1">
               <a:rPr kumimoji="1" lang="ja-JP" altLang="en-US" smtClean="0"/>
-              <a:t>2018/11/28</a:t>
+              <a:t>2018/12/7</a:t>
             </a:fld>
             <a:endParaRPr kumimoji="1" lang="ja-JP" altLang="en-US"/>
           </a:p>
@@ -2743,7 +2743,7 @@
           <a:p>
             <a:fld id="{0CFBF5D4-B5CC-4467-B796-C67F515DE3C5}" type="datetime1">
               <a:rPr kumimoji="1" lang="ja-JP" altLang="en-US" smtClean="0"/>
-              <a:t>2018/11/28</a:t>
+              <a:t>2018/12/7</a:t>
             </a:fld>
             <a:endParaRPr kumimoji="1" lang="ja-JP" altLang="en-US"/>
           </a:p>
@@ -3049,7 +3049,7 @@
           <a:p>
             <a:fld id="{A0163980-AAA3-47F9-A262-0D3864F1B223}" type="datetime1">
               <a:rPr kumimoji="1" lang="ja-JP" altLang="en-US" smtClean="0"/>
-              <a:t>2018/11/28</a:t>
+              <a:t>2018/12/7</a:t>
             </a:fld>
             <a:endParaRPr kumimoji="1" lang="ja-JP" altLang="en-US"/>
           </a:p>
@@ -3354,7 +3354,7 @@
           <a:p>
             <a:fld id="{848859B9-DC56-434E-8346-7979ED5DF987}" type="datetime1">
               <a:rPr kumimoji="1" lang="ja-JP" altLang="en-US" smtClean="0"/>
-              <a:t>2018/11/28</a:t>
+              <a:t>2018/12/7</a:t>
             </a:fld>
             <a:endParaRPr kumimoji="1" lang="ja-JP" altLang="en-US"/>
           </a:p>
@@ -3684,7 +3684,7 @@
           <a:p>
             <a:fld id="{8A9F02A4-63CC-4654-A6E7-8D37C032D0CA}" type="datetime1">
               <a:rPr kumimoji="1" lang="ja-JP" altLang="en-US" smtClean="0"/>
-              <a:t>2018/11/28</a:t>
+              <a:t>2018/12/7</a:t>
             </a:fld>
             <a:endParaRPr kumimoji="1" lang="ja-JP" altLang="en-US"/>
           </a:p>
@@ -4192,6 +4192,288 @@
       </p:grpSpPr>
       <p:sp>
         <p:nvSpPr>
+          <p:cNvPr id="2" name="タイトル 1"/>
+          <p:cNvSpPr>
+            <a:spLocks noGrp="1"/>
+          </p:cNvSpPr>
+          <p:nvPr>
+            <p:ph type="title"/>
+          </p:nvPr>
+        </p:nvSpPr>
+        <p:spPr/>
+        <p:txBody>
+          <a:bodyPr/>
+          <a:lstStyle/>
+          <a:p>
+            <a:r>
+              <a:rPr lang="ja-JP" altLang="en-US" dirty="0"/>
+              <a:t>出典</a:t>
+            </a:r>
+            <a:endParaRPr kumimoji="1" lang="ja-JP" altLang="en-US" dirty="0"/>
+          </a:p>
+        </p:txBody>
+      </p:sp>
+      <p:sp>
+        <p:nvSpPr>
+          <p:cNvPr id="3" name="コンテンツ プレースホルダー 2"/>
+          <p:cNvSpPr>
+            <a:spLocks noGrp="1"/>
+          </p:cNvSpPr>
+          <p:nvPr>
+            <p:ph idx="1"/>
+          </p:nvPr>
+        </p:nvSpPr>
+        <p:spPr/>
+        <p:txBody>
+          <a:bodyPr/>
+          <a:lstStyle/>
+          <a:p>
+            <a:r>
+              <a:rPr lang="ja-JP" altLang="en-US" b="1" dirty="0"/>
+              <a:t>ロジスティック回帰分析</a:t>
+            </a:r>
+            <a:endParaRPr lang="en-US" altLang="ja-JP" dirty="0"/>
+          </a:p>
+          <a:p>
+            <a:pPr lvl="1"/>
+            <a:r>
+              <a:rPr lang="en-US" altLang="ja-JP" dirty="0">
+                <a:hlinkClick r:id="rId2"/>
+              </a:rPr>
+              <a:t>https://qiita.com/fujin/items/7f0a7b6fc8fb662f510d</a:t>
+            </a:r>
+            <a:endParaRPr lang="en-US" altLang="ja-JP" dirty="0"/>
+          </a:p>
+          <a:p>
+            <a:r>
+              <a:rPr lang="en-US" altLang="ja-JP" sz="2000" dirty="0"/>
+              <a:t>Coursera Machine Learning (3): </a:t>
+            </a:r>
+            <a:r>
+              <a:rPr lang="ja-JP" altLang="en-US" sz="2000" dirty="0"/>
+              <a:t>ロジスティック回帰、正則化</a:t>
+            </a:r>
+            <a:endParaRPr lang="en-US" altLang="ja-JP" sz="2000" dirty="0"/>
+          </a:p>
+          <a:p>
+            <a:pPr lvl="1"/>
+            <a:r>
+              <a:rPr lang="en-US" altLang="ja-JP" dirty="0">
+                <a:hlinkClick r:id="rId3"/>
+              </a:rPr>
+              <a:t>https://qiita.com/katsu1110/items/e4ef613559f02f183af5</a:t>
+            </a:r>
+            <a:endParaRPr lang="en-US" altLang="ja-JP" dirty="0"/>
+          </a:p>
+          <a:p>
+            <a:endParaRPr kumimoji="1" lang="ja-JP" altLang="en-US" dirty="0"/>
+          </a:p>
+        </p:txBody>
+      </p:sp>
+      <p:sp>
+        <p:nvSpPr>
+          <p:cNvPr id="4" name="スライド番号プレースホルダー 3"/>
+          <p:cNvSpPr>
+            <a:spLocks noGrp="1"/>
+          </p:cNvSpPr>
+          <p:nvPr>
+            <p:ph type="sldNum" sz="quarter" idx="12"/>
+          </p:nvPr>
+        </p:nvSpPr>
+        <p:spPr/>
+        <p:txBody>
+          <a:bodyPr/>
+          <a:lstStyle/>
+          <a:p>
+            <a:fld id="{D2D8002D-B5B0-4BAC-B1F6-782DDCCE6D9C}" type="slidenum">
+              <a:rPr kumimoji="1" lang="ja-JP" altLang="en-US" smtClean="0"/>
+              <a:t>10</a:t>
+            </a:fld>
+            <a:endParaRPr kumimoji="1" lang="ja-JP" altLang="en-US"/>
+          </a:p>
+        </p:txBody>
+      </p:sp>
+    </p:spTree>
+    <p:extLst>
+      <p:ext uri="{BB962C8B-B14F-4D97-AF65-F5344CB8AC3E}">
+        <p14:creationId xmlns:p14="http://schemas.microsoft.com/office/powerpoint/2010/main" val="621174911"/>
+      </p:ext>
+    </p:extLst>
+  </p:cSld>
+  <p:clrMapOvr>
+    <a:masterClrMapping/>
+  </p:clrMapOvr>
+</p:sld>
+</file>
+
+<file path=ppt/slides/slide11.xml><?xml version="1.0" encoding="utf-8"?>
+<p:sld xmlns:a="http://schemas.openxmlformats.org/drawingml/2006/main" xmlns:r="http://schemas.openxmlformats.org/officeDocument/2006/relationships" xmlns:p="http://schemas.openxmlformats.org/presentationml/2006/main">
+  <p:cSld>
+    <p:spTree>
+      <p:nvGrpSpPr>
+        <p:cNvPr id="1" name=""/>
+        <p:cNvGrpSpPr/>
+        <p:nvPr/>
+      </p:nvGrpSpPr>
+      <p:grpSpPr>
+        <a:xfrm>
+          <a:off x="0" y="0"/>
+          <a:ext cx="0" cy="0"/>
+          <a:chOff x="0" y="0"/>
+          <a:chExt cx="0" cy="0"/>
+        </a:xfrm>
+      </p:grpSpPr>
+      <p:sp>
+        <p:nvSpPr>
+          <p:cNvPr id="2" name="タイトル 1"/>
+          <p:cNvSpPr>
+            <a:spLocks noGrp="1"/>
+          </p:cNvSpPr>
+          <p:nvPr>
+            <p:ph type="title"/>
+          </p:nvPr>
+        </p:nvSpPr>
+        <p:spPr/>
+        <p:txBody>
+          <a:bodyPr/>
+          <a:lstStyle/>
+          <a:p>
+            <a:r>
+              <a:rPr lang="ja-JP" altLang="en-US" dirty="0"/>
+              <a:t>理論的背景（目次）</a:t>
+            </a:r>
+            <a:endParaRPr kumimoji="1" lang="ja-JP" altLang="en-US" dirty="0"/>
+          </a:p>
+        </p:txBody>
+      </p:sp>
+      <p:sp>
+        <p:nvSpPr>
+          <p:cNvPr id="4" name="スライド番号プレースホルダー 3"/>
+          <p:cNvSpPr>
+            <a:spLocks noGrp="1"/>
+          </p:cNvSpPr>
+          <p:nvPr>
+            <p:ph type="sldNum" sz="quarter" idx="12"/>
+          </p:nvPr>
+        </p:nvSpPr>
+        <p:spPr/>
+        <p:txBody>
+          <a:bodyPr/>
+          <a:lstStyle/>
+          <a:p>
+            <a:fld id="{D2D8002D-B5B0-4BAC-B1F6-782DDCCE6D9C}" type="slidenum">
+              <a:rPr kumimoji="1" lang="ja-JP" altLang="en-US" smtClean="0"/>
+              <a:t>11</a:t>
+            </a:fld>
+            <a:endParaRPr kumimoji="1" lang="ja-JP" altLang="en-US"/>
+          </a:p>
+        </p:txBody>
+      </p:sp>
+      <p:sp>
+        <p:nvSpPr>
+          <p:cNvPr id="3" name="テキスト ボックス 2">
+            <a:extLst>
+              <a:ext uri="{FF2B5EF4-FFF2-40B4-BE49-F238E27FC236}">
+                <a16:creationId xmlns:a16="http://schemas.microsoft.com/office/drawing/2014/main" id="{667B49C2-E67A-42DD-A915-D509CF0C8C99}"/>
+              </a:ext>
+            </a:extLst>
+          </p:cNvPr>
+          <p:cNvSpPr txBox="1"/>
+          <p:nvPr/>
+        </p:nvSpPr>
+        <p:spPr>
+          <a:xfrm>
+            <a:off x="755576" y="1568355"/>
+            <a:ext cx="2214315" cy="1759900"/>
+          </a:xfrm>
+          <a:prstGeom prst="rect">
+            <a:avLst/>
+          </a:prstGeom>
+          <a:noFill/>
+        </p:spPr>
+        <p:txBody>
+          <a:bodyPr wrap="none" lIns="36000" tIns="0" rIns="36000" bIns="36000" rtlCol="0">
+            <a:spAutoFit/>
+          </a:bodyPr>
+          <a:lstStyle/>
+          <a:p>
+            <a:pPr marL="342900" indent="-342900">
+              <a:buFont typeface="+mj-lt"/>
+              <a:buAutoNum type="arabicPeriod"/>
+            </a:pPr>
+            <a:r>
+              <a:rPr lang="ja-JP" altLang="en-US" sz="2800" dirty="0"/>
+              <a:t>考え方</a:t>
+            </a:r>
+            <a:endParaRPr lang="en-US" altLang="ja-JP" sz="2800" dirty="0"/>
+          </a:p>
+          <a:p>
+            <a:pPr marL="342900" indent="-342900">
+              <a:buFont typeface="+mj-lt"/>
+              <a:buAutoNum type="arabicPeriod"/>
+            </a:pPr>
+            <a:r>
+              <a:rPr kumimoji="1" lang="ja-JP" altLang="en-US" sz="2800" dirty="0"/>
+              <a:t>目的関数</a:t>
+            </a:r>
+            <a:endParaRPr kumimoji="1" lang="en-US" altLang="ja-JP" sz="2800" dirty="0"/>
+          </a:p>
+          <a:p>
+            <a:pPr marL="342900" indent="-342900">
+              <a:buFont typeface="+mj-lt"/>
+              <a:buAutoNum type="arabicPeriod"/>
+            </a:pPr>
+            <a:r>
+              <a:rPr lang="ja-JP" altLang="en-US" sz="2800" dirty="0"/>
+              <a:t>最急降下法</a:t>
+            </a:r>
+            <a:endParaRPr lang="en-US" altLang="ja-JP" sz="2800" dirty="0"/>
+          </a:p>
+          <a:p>
+            <a:pPr marL="342900" indent="-342900">
+              <a:buFont typeface="+mj-lt"/>
+              <a:buAutoNum type="arabicPeriod"/>
+            </a:pPr>
+            <a:r>
+              <a:rPr lang="ja-JP" altLang="en-US" sz="2800" dirty="0"/>
+              <a:t>コスト関数</a:t>
+            </a:r>
+            <a:endParaRPr kumimoji="1" lang="ja-JP" altLang="en-US" sz="2800" dirty="0"/>
+          </a:p>
+        </p:txBody>
+      </p:sp>
+    </p:spTree>
+    <p:extLst>
+      <p:ext uri="{BB962C8B-B14F-4D97-AF65-F5344CB8AC3E}">
+        <p14:creationId xmlns:p14="http://schemas.microsoft.com/office/powerpoint/2010/main" val="3303200950"/>
+      </p:ext>
+    </p:extLst>
+  </p:cSld>
+  <p:clrMapOvr>
+    <a:masterClrMapping/>
+  </p:clrMapOvr>
+</p:sld>
+</file>
+
+<file path=ppt/slides/slide12.xml><?xml version="1.0" encoding="utf-8"?>
+<p:sld xmlns:a="http://schemas.openxmlformats.org/drawingml/2006/main" xmlns:r="http://schemas.openxmlformats.org/officeDocument/2006/relationships" xmlns:p="http://schemas.openxmlformats.org/presentationml/2006/main">
+  <p:cSld>
+    <p:spTree>
+      <p:nvGrpSpPr>
+        <p:cNvPr id="1" name=""/>
+        <p:cNvGrpSpPr/>
+        <p:nvPr/>
+      </p:nvGrpSpPr>
+      <p:grpSpPr>
+        <a:xfrm>
+          <a:off x="0" y="0"/>
+          <a:ext cx="0" cy="0"/>
+          <a:chOff x="0" y="0"/>
+          <a:chExt cx="0" cy="0"/>
+        </a:xfrm>
+      </p:grpSpPr>
+      <p:sp>
+        <p:nvSpPr>
           <p:cNvPr id="13" name="矢印: 下 12">
             <a:extLst>
               <a:ext uri="{FF2B5EF4-FFF2-40B4-BE49-F238E27FC236}">
@@ -4357,7 +4639,7 @@
           <a:p>
             <a:fld id="{D2D8002D-B5B0-4BAC-B1F6-782DDCCE6D9C}" type="slidenum">
               <a:rPr kumimoji="1" lang="ja-JP" altLang="en-US" smtClean="0"/>
-              <a:t>10</a:t>
+              <a:t>12</a:t>
             </a:fld>
             <a:endParaRPr kumimoji="1" lang="ja-JP" altLang="en-US"/>
           </a:p>
@@ -4997,7 +5279,7 @@
 </p:sld>
 </file>
 
-<file path=ppt/slides/slide11.xml><?xml version="1.0" encoding="utf-8"?>
+<file path=ppt/slides/slide13.xml><?xml version="1.0" encoding="utf-8"?>
 <p:sld xmlns:a="http://schemas.openxmlformats.org/drawingml/2006/main" xmlns:r="http://schemas.openxmlformats.org/officeDocument/2006/relationships" xmlns:p="http://schemas.openxmlformats.org/presentationml/2006/main">
   <p:cSld>
     <p:spTree>
@@ -5131,7 +5413,7 @@
           <a:p>
             <a:fld id="{D2D8002D-B5B0-4BAC-B1F6-782DDCCE6D9C}" type="slidenum">
               <a:rPr kumimoji="1" lang="ja-JP" altLang="en-US" smtClean="0"/>
-              <a:t>11</a:t>
+              <a:t>13</a:t>
             </a:fld>
             <a:endParaRPr kumimoji="1" lang="ja-JP" altLang="en-US"/>
           </a:p>
@@ -5433,7 +5715,7 @@
 </p:sld>
 </file>
 
-<file path=ppt/slides/slide12.xml><?xml version="1.0" encoding="utf-8"?>
+<file path=ppt/slides/slide14.xml><?xml version="1.0" encoding="utf-8"?>
 <p:sld xmlns:a="http://schemas.openxmlformats.org/drawingml/2006/main" xmlns:r="http://schemas.openxmlformats.org/officeDocument/2006/relationships" xmlns:p="http://schemas.openxmlformats.org/presentationml/2006/main">
   <p:cSld>
     <p:spTree>
@@ -5510,7 +5792,7 @@
           <a:p>
             <a:fld id="{D2D8002D-B5B0-4BAC-B1F6-782DDCCE6D9C}" type="slidenum">
               <a:rPr kumimoji="1" lang="ja-JP" altLang="en-US" smtClean="0"/>
-              <a:t>12</a:t>
+              <a:t>14</a:t>
             </a:fld>
             <a:endParaRPr kumimoji="1" lang="ja-JP" altLang="en-US"/>
           </a:p>
@@ -5864,7 +6146,7 @@
 </p:sld>
 </file>
 
-<file path=ppt/slides/slide13.xml><?xml version="1.0" encoding="utf-8"?>
+<file path=ppt/slides/slide15.xml><?xml version="1.0" encoding="utf-8"?>
 <p:sld xmlns:a="http://schemas.openxmlformats.org/drawingml/2006/main" xmlns:r="http://schemas.openxmlformats.org/officeDocument/2006/relationships" xmlns:p="http://schemas.openxmlformats.org/presentationml/2006/main">
   <p:cSld>
     <p:spTree>
@@ -5933,7 +6215,7 @@
           <a:p>
             <a:fld id="{D2D8002D-B5B0-4BAC-B1F6-782DDCCE6D9C}" type="slidenum">
               <a:rPr kumimoji="1" lang="ja-JP" altLang="en-US" smtClean="0"/>
-              <a:t>13</a:t>
+              <a:t>15</a:t>
             </a:fld>
             <a:endParaRPr kumimoji="1" lang="ja-JP" altLang="en-US"/>
           </a:p>
@@ -6307,441 +6589,6 @@
     <p:extLst>
       <p:ext uri="{BB962C8B-B14F-4D97-AF65-F5344CB8AC3E}">
         <p14:creationId xmlns:p14="http://schemas.microsoft.com/office/powerpoint/2010/main" val="1181839971"/>
-      </p:ext>
-    </p:extLst>
-  </p:cSld>
-  <p:clrMapOvr>
-    <a:masterClrMapping/>
-  </p:clrMapOvr>
-</p:sld>
-</file>
-
-<file path=ppt/slides/slide14.xml><?xml version="1.0" encoding="utf-8"?>
-<p:sld xmlns:a="http://schemas.openxmlformats.org/drawingml/2006/main" xmlns:r="http://schemas.openxmlformats.org/officeDocument/2006/relationships" xmlns:p="http://schemas.openxmlformats.org/presentationml/2006/main">
-  <p:cSld>
-    <p:spTree>
-      <p:nvGrpSpPr>
-        <p:cNvPr id="1" name=""/>
-        <p:cNvGrpSpPr/>
-        <p:nvPr/>
-      </p:nvGrpSpPr>
-      <p:grpSpPr>
-        <a:xfrm>
-          <a:off x="0" y="0"/>
-          <a:ext cx="0" cy="0"/>
-          <a:chOff x="0" y="0"/>
-          <a:chExt cx="0" cy="0"/>
-        </a:xfrm>
-      </p:grpSpPr>
-      <p:sp>
-        <p:nvSpPr>
-          <p:cNvPr id="2" name="タイトル 1"/>
-          <p:cNvSpPr>
-            <a:spLocks noGrp="1"/>
-          </p:cNvSpPr>
-          <p:nvPr>
-            <p:ph type="title"/>
-          </p:nvPr>
-        </p:nvSpPr>
-        <p:spPr/>
-        <p:txBody>
-          <a:bodyPr/>
-          <a:lstStyle/>
-          <a:p>
-            <a:r>
-              <a:rPr lang="ja-JP" altLang="en-US" dirty="0"/>
-              <a:t>出典</a:t>
-            </a:r>
-            <a:endParaRPr kumimoji="1" lang="ja-JP" altLang="en-US" dirty="0"/>
-          </a:p>
-        </p:txBody>
-      </p:sp>
-      <p:sp>
-        <p:nvSpPr>
-          <p:cNvPr id="3" name="コンテンツ プレースホルダー 2"/>
-          <p:cNvSpPr>
-            <a:spLocks noGrp="1"/>
-          </p:cNvSpPr>
-          <p:nvPr>
-            <p:ph idx="1"/>
-          </p:nvPr>
-        </p:nvSpPr>
-        <p:spPr/>
-        <p:txBody>
-          <a:bodyPr/>
-          <a:lstStyle/>
-          <a:p>
-            <a:r>
-              <a:rPr lang="ja-JP" altLang="en-US" b="1" dirty="0"/>
-              <a:t>ロジスティック回帰分析</a:t>
-            </a:r>
-            <a:endParaRPr lang="en-US" altLang="ja-JP" dirty="0"/>
-          </a:p>
-          <a:p>
-            <a:pPr lvl="1"/>
-            <a:r>
-              <a:rPr lang="en-US" altLang="ja-JP" dirty="0">
-                <a:hlinkClick r:id="rId2"/>
-              </a:rPr>
-              <a:t>https://qiita.com/fujin/items/7f0a7b6fc8fb662f510d</a:t>
-            </a:r>
-            <a:endParaRPr lang="en-US" altLang="ja-JP" dirty="0"/>
-          </a:p>
-          <a:p>
-            <a:r>
-              <a:rPr lang="en-US" altLang="ja-JP" sz="2000" dirty="0"/>
-              <a:t>Coursera Machine Learning (3): </a:t>
-            </a:r>
-            <a:r>
-              <a:rPr lang="ja-JP" altLang="en-US" sz="2000" dirty="0"/>
-              <a:t>ロジスティック回帰、正則化</a:t>
-            </a:r>
-            <a:endParaRPr lang="en-US" altLang="ja-JP" sz="2000" dirty="0"/>
-          </a:p>
-          <a:p>
-            <a:pPr lvl="1"/>
-            <a:r>
-              <a:rPr lang="en-US" altLang="ja-JP" dirty="0">
-                <a:hlinkClick r:id="rId3"/>
-              </a:rPr>
-              <a:t>https://qiita.com/katsu1110/items/e4ef613559f02f183af5</a:t>
-            </a:r>
-            <a:endParaRPr lang="en-US" altLang="ja-JP" dirty="0"/>
-          </a:p>
-          <a:p>
-            <a:endParaRPr kumimoji="1" lang="ja-JP" altLang="en-US" dirty="0"/>
-          </a:p>
-        </p:txBody>
-      </p:sp>
-      <p:sp>
-        <p:nvSpPr>
-          <p:cNvPr id="4" name="スライド番号プレースホルダー 3"/>
-          <p:cNvSpPr>
-            <a:spLocks noGrp="1"/>
-          </p:cNvSpPr>
-          <p:nvPr>
-            <p:ph type="sldNum" sz="quarter" idx="12"/>
-          </p:nvPr>
-        </p:nvSpPr>
-        <p:spPr/>
-        <p:txBody>
-          <a:bodyPr/>
-          <a:lstStyle/>
-          <a:p>
-            <a:fld id="{D2D8002D-B5B0-4BAC-B1F6-782DDCCE6D9C}" type="slidenum">
-              <a:rPr kumimoji="1" lang="ja-JP" altLang="en-US" smtClean="0"/>
-              <a:t>14</a:t>
-            </a:fld>
-            <a:endParaRPr kumimoji="1" lang="ja-JP" altLang="en-US"/>
-          </a:p>
-        </p:txBody>
-      </p:sp>
-    </p:spTree>
-    <p:extLst>
-      <p:ext uri="{BB962C8B-B14F-4D97-AF65-F5344CB8AC3E}">
-        <p14:creationId xmlns:p14="http://schemas.microsoft.com/office/powerpoint/2010/main" val="621174911"/>
-      </p:ext>
-    </p:extLst>
-  </p:cSld>
-  <p:clrMapOvr>
-    <a:masterClrMapping/>
-  </p:clrMapOvr>
-</p:sld>
-</file>
-
-<file path=ppt/slides/slide15.xml><?xml version="1.0" encoding="utf-8"?>
-<p:sld xmlns:a="http://schemas.openxmlformats.org/drawingml/2006/main" xmlns:r="http://schemas.openxmlformats.org/officeDocument/2006/relationships" xmlns:p="http://schemas.openxmlformats.org/presentationml/2006/main">
-  <p:cSld>
-    <p:spTree>
-      <p:nvGrpSpPr>
-        <p:cNvPr id="1" name=""/>
-        <p:cNvGrpSpPr/>
-        <p:nvPr/>
-      </p:nvGrpSpPr>
-      <p:grpSpPr>
-        <a:xfrm>
-          <a:off x="0" y="0"/>
-          <a:ext cx="0" cy="0"/>
-          <a:chOff x="0" y="0"/>
-          <a:chExt cx="0" cy="0"/>
-        </a:xfrm>
-      </p:grpSpPr>
-      <p:sp>
-        <p:nvSpPr>
-          <p:cNvPr id="2" name="タイトル 1"/>
-          <p:cNvSpPr>
-            <a:spLocks noGrp="1"/>
-          </p:cNvSpPr>
-          <p:nvPr>
-            <p:ph type="title"/>
-          </p:nvPr>
-        </p:nvSpPr>
-        <p:spPr/>
-        <p:txBody>
-          <a:bodyPr/>
-          <a:lstStyle/>
-          <a:p>
-            <a:r>
-              <a:rPr kumimoji="1" lang="ja-JP" altLang="en-US" dirty="0"/>
-              <a:t>関連するパターン</a:t>
-            </a:r>
-          </a:p>
-        </p:txBody>
-      </p:sp>
-      <p:sp>
-        <p:nvSpPr>
-          <p:cNvPr id="3" name="コンテンツ プレースホルダー 2"/>
-          <p:cNvSpPr>
-            <a:spLocks noGrp="1"/>
-          </p:cNvSpPr>
-          <p:nvPr>
-            <p:ph idx="1"/>
-          </p:nvPr>
-        </p:nvSpPr>
-        <p:spPr/>
-        <p:txBody>
-          <a:bodyPr/>
-          <a:lstStyle/>
-          <a:p>
-            <a:r>
-              <a:rPr lang="ja-JP" altLang="en-US" dirty="0"/>
-              <a:t>線形分離可能な観点</a:t>
-            </a:r>
-            <a:endParaRPr kumimoji="1" lang="en-US" altLang="ja-JP" dirty="0"/>
-          </a:p>
-          <a:p>
-            <a:pPr lvl="1"/>
-            <a:r>
-              <a:rPr lang="ja-JP" altLang="en-US" dirty="0"/>
-              <a:t>線形回帰</a:t>
-            </a:r>
-            <a:r>
-              <a:rPr lang="en-US" altLang="ja-JP" dirty="0"/>
-              <a:t>			</a:t>
-            </a:r>
-            <a:r>
-              <a:rPr lang="en-US" altLang="ja-JP" dirty="0" err="1"/>
-              <a:t>LinearRegression</a:t>
-            </a:r>
-            <a:endParaRPr lang="en-US" altLang="ja-JP" dirty="0"/>
-          </a:p>
-          <a:p>
-            <a:pPr lvl="1"/>
-            <a:r>
-              <a:rPr lang="en-US" altLang="ja-JP" dirty="0"/>
-              <a:t>Lasso</a:t>
-            </a:r>
-            <a:r>
-              <a:rPr lang="ja-JP" altLang="en-US" dirty="0"/>
-              <a:t>回帰（</a:t>
-            </a:r>
-            <a:r>
-              <a:rPr lang="en-US" altLang="ja-JP" dirty="0"/>
-              <a:t>L1</a:t>
-            </a:r>
-            <a:r>
-              <a:rPr lang="ja-JP" altLang="en-US" dirty="0"/>
-              <a:t>正則化）</a:t>
-            </a:r>
-            <a:r>
-              <a:rPr lang="en-US" altLang="ja-JP" dirty="0"/>
-              <a:t>	Lasso</a:t>
-            </a:r>
-          </a:p>
-          <a:p>
-            <a:pPr lvl="1"/>
-            <a:r>
-              <a:rPr kumimoji="1" lang="en-US" altLang="ja-JP" dirty="0"/>
-              <a:t>Lasso</a:t>
-            </a:r>
-            <a:r>
-              <a:rPr kumimoji="1" lang="ja-JP" altLang="en-US" dirty="0"/>
-              <a:t>回帰（</a:t>
-            </a:r>
-            <a:r>
-              <a:rPr kumimoji="1" lang="en-US" altLang="ja-JP" dirty="0"/>
-              <a:t>L2</a:t>
-            </a:r>
-            <a:r>
-              <a:rPr kumimoji="1" lang="ja-JP" altLang="en-US" dirty="0"/>
-              <a:t>正則化）</a:t>
-            </a:r>
-            <a:r>
-              <a:rPr kumimoji="1" lang="en-US" altLang="ja-JP" dirty="0"/>
-              <a:t>	Ridge</a:t>
-            </a:r>
-          </a:p>
-          <a:p>
-            <a:r>
-              <a:rPr kumimoji="1" lang="ja-JP" altLang="en-US" dirty="0"/>
-              <a:t>「分類」観点</a:t>
-            </a:r>
-            <a:endParaRPr kumimoji="1" lang="en-US" altLang="ja-JP" dirty="0"/>
-          </a:p>
-          <a:p>
-            <a:pPr lvl="1"/>
-            <a:r>
-              <a:rPr lang="ja-JP" altLang="en-US" dirty="0"/>
-              <a:t>線形サポートベクターマシン</a:t>
-            </a:r>
-            <a:r>
-              <a:rPr lang="en-US" altLang="ja-JP" dirty="0"/>
-              <a:t>	</a:t>
-            </a:r>
-            <a:r>
-              <a:rPr lang="en-US" altLang="ja-JP" dirty="0" err="1"/>
-              <a:t>LinearSVC</a:t>
-            </a:r>
-            <a:endParaRPr lang="en-US" altLang="ja-JP" dirty="0"/>
-          </a:p>
-          <a:p>
-            <a:pPr lvl="1"/>
-            <a:r>
-              <a:rPr kumimoji="1" lang="ja-JP" altLang="en-US" dirty="0"/>
-              <a:t>決定木</a:t>
-            </a:r>
-            <a:r>
-              <a:rPr lang="en-US" altLang="ja-JP" dirty="0"/>
-              <a:t>			</a:t>
-            </a:r>
-            <a:r>
-              <a:rPr lang="en-US" altLang="ja-JP" dirty="0" err="1"/>
-              <a:t>DecisionTreeClassifier</a:t>
-            </a:r>
-            <a:endParaRPr lang="en-US" altLang="ja-JP" dirty="0"/>
-          </a:p>
-          <a:p>
-            <a:pPr lvl="1"/>
-            <a:r>
-              <a:rPr kumimoji="1" lang="ja-JP" altLang="en-US" dirty="0"/>
-              <a:t>サポートベクターマシン</a:t>
-            </a:r>
-            <a:r>
-              <a:rPr kumimoji="1" lang="en-US" altLang="ja-JP" dirty="0"/>
-              <a:t>	SVC</a:t>
-            </a:r>
-          </a:p>
-          <a:p>
-            <a:pPr lvl="1"/>
-            <a:r>
-              <a:rPr kumimoji="1" lang="ja-JP" altLang="en-US" dirty="0"/>
-              <a:t>ニューラルネットワーク </a:t>
-            </a:r>
-            <a:r>
-              <a:rPr lang="en-US" altLang="ja-JP" dirty="0"/>
-              <a:t>※	</a:t>
-            </a:r>
-            <a:r>
-              <a:rPr lang="ja-JP" altLang="en-US" dirty="0"/>
-              <a:t>パーセプトロン、</a:t>
-            </a:r>
-            <a:r>
-              <a:rPr lang="en-US" altLang="ja-JP" dirty="0"/>
-              <a:t>CNN</a:t>
-            </a:r>
-            <a:r>
-              <a:rPr lang="ja-JP" altLang="en-US" dirty="0" err="1"/>
-              <a:t>、</a:t>
-            </a:r>
-            <a:r>
-              <a:rPr lang="en-US" altLang="ja-JP" dirty="0"/>
-              <a:t>RNN</a:t>
-            </a:r>
-            <a:r>
-              <a:rPr lang="ja-JP" altLang="en-US" dirty="0"/>
-              <a:t>など</a:t>
-            </a:r>
-            <a:endParaRPr lang="en-US" altLang="ja-JP" dirty="0"/>
-          </a:p>
-          <a:p>
-            <a:pPr lvl="1"/>
-            <a:r>
-              <a:rPr kumimoji="1" lang="en-US" altLang="ja-JP" dirty="0"/>
-              <a:t>K</a:t>
-            </a:r>
-            <a:r>
-              <a:rPr kumimoji="1" lang="ja-JP" altLang="en-US" dirty="0"/>
-              <a:t>近傍法</a:t>
-            </a:r>
-            <a:r>
-              <a:rPr lang="en-US" altLang="ja-JP" dirty="0"/>
-              <a:t>			</a:t>
-            </a:r>
-            <a:r>
-              <a:rPr lang="en-US" altLang="ja-JP" dirty="0" err="1"/>
-              <a:t>KNeighborsClassifier</a:t>
-            </a:r>
-            <a:endParaRPr lang="en-US" altLang="ja-JP" dirty="0"/>
-          </a:p>
-          <a:p>
-            <a:pPr marL="274320" lvl="1" indent="0">
-              <a:buNone/>
-            </a:pPr>
-            <a:endParaRPr lang="en-US" altLang="ja-JP" dirty="0"/>
-          </a:p>
-          <a:p>
-            <a:pPr marL="0" indent="0">
-              <a:buNone/>
-            </a:pPr>
-            <a:r>
-              <a:rPr kumimoji="1" lang="en-US" altLang="ja-JP" sz="1800" dirty="0"/>
-              <a:t>※</a:t>
-            </a:r>
-            <a:r>
-              <a:rPr kumimoji="1" lang="ja-JP" altLang="en-US" sz="1800" dirty="0"/>
-              <a:t> </a:t>
-            </a:r>
-            <a:r>
-              <a:rPr kumimoji="1" lang="en-US" altLang="ja-JP" sz="1800" dirty="0"/>
-              <a:t>TensorFlow/</a:t>
-            </a:r>
-            <a:r>
-              <a:rPr kumimoji="1" lang="en-US" altLang="ja-JP" sz="1800" dirty="0" err="1"/>
-              <a:t>Keras</a:t>
-            </a:r>
-            <a:r>
-              <a:rPr kumimoji="1" lang="en-US" altLang="ja-JP" sz="1800" dirty="0"/>
-              <a:t> </a:t>
-            </a:r>
-            <a:r>
-              <a:rPr kumimoji="1" lang="ja-JP" altLang="en-US" sz="1800" dirty="0"/>
-              <a:t>のみ</a:t>
-            </a:r>
-            <a:endParaRPr kumimoji="1" lang="en-US" altLang="ja-JP" sz="1800" dirty="0"/>
-          </a:p>
-          <a:p>
-            <a:pPr lvl="1"/>
-            <a:endParaRPr lang="en-US" altLang="ja-JP" dirty="0"/>
-          </a:p>
-        </p:txBody>
-      </p:sp>
-      <p:sp>
-        <p:nvSpPr>
-          <p:cNvPr id="4" name="スライド番号プレースホルダー 3"/>
-          <p:cNvSpPr>
-            <a:spLocks noGrp="1"/>
-          </p:cNvSpPr>
-          <p:nvPr>
-            <p:ph type="sldNum" sz="quarter" idx="12"/>
-          </p:nvPr>
-        </p:nvSpPr>
-        <p:spPr/>
-        <p:txBody>
-          <a:bodyPr/>
-          <a:lstStyle/>
-          <a:p>
-            <a:fld id="{D2D8002D-B5B0-4BAC-B1F6-782DDCCE6D9C}" type="slidenum">
-              <a:rPr kumimoji="1" lang="ja-JP" altLang="en-US" smtClean="0"/>
-              <a:t>15</a:t>
-            </a:fld>
-            <a:endParaRPr kumimoji="1" lang="ja-JP" altLang="en-US"/>
-          </a:p>
-        </p:txBody>
-      </p:sp>
-    </p:spTree>
-    <p:extLst>
-      <p:ext uri="{BB962C8B-B14F-4D97-AF65-F5344CB8AC3E}">
-        <p14:creationId xmlns:p14="http://schemas.microsoft.com/office/powerpoint/2010/main" val="1627899226"/>
       </p:ext>
     </p:extLst>
   </p:cSld>
@@ -8692,10 +8539,236 @@
           <a:lstStyle/>
           <a:p>
             <a:r>
+              <a:rPr kumimoji="1" lang="ja-JP" altLang="en-US" dirty="0"/>
+              <a:t>関連するパターン</a:t>
+            </a:r>
+          </a:p>
+        </p:txBody>
+      </p:sp>
+      <p:sp>
+        <p:nvSpPr>
+          <p:cNvPr id="3" name="コンテンツ プレースホルダー 2"/>
+          <p:cNvSpPr>
+            <a:spLocks noGrp="1"/>
+          </p:cNvSpPr>
+          <p:nvPr>
+            <p:ph idx="1"/>
+          </p:nvPr>
+        </p:nvSpPr>
+        <p:spPr/>
+        <p:txBody>
+          <a:bodyPr/>
+          <a:lstStyle/>
+          <a:p>
+            <a:r>
               <a:rPr lang="ja-JP" altLang="en-US" dirty="0"/>
-              <a:t>理論的背景（目次）</a:t>
-            </a:r>
-            <a:endParaRPr kumimoji="1" lang="ja-JP" altLang="en-US" dirty="0"/>
+              <a:t>線形分離可能な観点</a:t>
+            </a:r>
+            <a:endParaRPr kumimoji="1" lang="en-US" altLang="ja-JP" dirty="0"/>
+          </a:p>
+          <a:p>
+            <a:pPr lvl="1"/>
+            <a:r>
+              <a:rPr lang="ja-JP" altLang="en-US" dirty="0"/>
+              <a:t>線形回帰</a:t>
+            </a:r>
+            <a:r>
+              <a:rPr lang="en-US" altLang="ja-JP" dirty="0"/>
+              <a:t>			</a:t>
+            </a:r>
+            <a:r>
+              <a:rPr lang="en-US" altLang="ja-JP" dirty="0" err="1"/>
+              <a:t>LinearRegression</a:t>
+            </a:r>
+            <a:endParaRPr lang="en-US" altLang="ja-JP" dirty="0"/>
+          </a:p>
+          <a:p>
+            <a:pPr lvl="1"/>
+            <a:r>
+              <a:rPr lang="en-US" altLang="ja-JP" dirty="0"/>
+              <a:t>Lasso</a:t>
+            </a:r>
+            <a:r>
+              <a:rPr lang="ja-JP" altLang="en-US" dirty="0"/>
+              <a:t>回帰（</a:t>
+            </a:r>
+            <a:r>
+              <a:rPr lang="en-US" altLang="ja-JP" dirty="0"/>
+              <a:t>L1</a:t>
+            </a:r>
+            <a:r>
+              <a:rPr lang="ja-JP" altLang="en-US" dirty="0"/>
+              <a:t>正則化）</a:t>
+            </a:r>
+            <a:r>
+              <a:rPr lang="en-US" altLang="ja-JP" dirty="0"/>
+              <a:t>	Lasso</a:t>
+            </a:r>
+          </a:p>
+          <a:p>
+            <a:pPr lvl="1"/>
+            <a:r>
+              <a:rPr kumimoji="1" lang="en-US" altLang="ja-JP" dirty="0"/>
+              <a:t>Lasso</a:t>
+            </a:r>
+            <a:r>
+              <a:rPr kumimoji="1" lang="ja-JP" altLang="en-US" dirty="0"/>
+              <a:t>回帰（</a:t>
+            </a:r>
+            <a:r>
+              <a:rPr kumimoji="1" lang="en-US" altLang="ja-JP" dirty="0"/>
+              <a:t>L2</a:t>
+            </a:r>
+            <a:r>
+              <a:rPr kumimoji="1" lang="ja-JP" altLang="en-US" dirty="0"/>
+              <a:t>正則化）</a:t>
+            </a:r>
+            <a:r>
+              <a:rPr kumimoji="1" lang="en-US" altLang="ja-JP" dirty="0"/>
+              <a:t>	Ridge</a:t>
+            </a:r>
+          </a:p>
+          <a:p>
+            <a:r>
+              <a:rPr kumimoji="1" lang="ja-JP" altLang="en-US" dirty="0"/>
+              <a:t>「分類」観点</a:t>
+            </a:r>
+            <a:endParaRPr kumimoji="1" lang="en-US" altLang="ja-JP" dirty="0"/>
+          </a:p>
+          <a:p>
+            <a:pPr lvl="1"/>
+            <a:r>
+              <a:rPr lang="ja-JP" altLang="en-US" dirty="0"/>
+              <a:t>線形サポートベクターマシン</a:t>
+            </a:r>
+            <a:r>
+              <a:rPr lang="en-US" altLang="ja-JP" dirty="0"/>
+              <a:t>	</a:t>
+            </a:r>
+            <a:r>
+              <a:rPr lang="en-US" altLang="ja-JP" dirty="0" err="1"/>
+              <a:t>LinearSVC</a:t>
+            </a:r>
+            <a:endParaRPr lang="en-US" altLang="ja-JP" dirty="0"/>
+          </a:p>
+          <a:p>
+            <a:pPr lvl="1"/>
+            <a:r>
+              <a:rPr kumimoji="1" lang="ja-JP" altLang="en-US" dirty="0"/>
+              <a:t>決定木</a:t>
+            </a:r>
+            <a:r>
+              <a:rPr lang="en-US" altLang="ja-JP" dirty="0"/>
+              <a:t>			</a:t>
+            </a:r>
+            <a:r>
+              <a:rPr lang="en-US" altLang="ja-JP" dirty="0" err="1"/>
+              <a:t>DecisionTreeClassifier</a:t>
+            </a:r>
+            <a:endParaRPr lang="en-US" altLang="ja-JP" dirty="0"/>
+          </a:p>
+          <a:p>
+            <a:pPr lvl="1"/>
+            <a:r>
+              <a:rPr kumimoji="1" lang="ja-JP" altLang="en-US" dirty="0"/>
+              <a:t>サポートベクターマシン</a:t>
+            </a:r>
+            <a:r>
+              <a:rPr kumimoji="1" lang="en-US" altLang="ja-JP" dirty="0"/>
+              <a:t>	SVC</a:t>
+            </a:r>
+          </a:p>
+          <a:p>
+            <a:pPr lvl="1"/>
+            <a:r>
+              <a:rPr kumimoji="1" lang="ja-JP" altLang="en-US" dirty="0"/>
+              <a:t>ニューラルネットワーク </a:t>
+            </a:r>
+            <a:r>
+              <a:rPr lang="en-US" altLang="ja-JP" dirty="0"/>
+              <a:t>※	</a:t>
+            </a:r>
+            <a:r>
+              <a:rPr lang="ja-JP" altLang="en-US" dirty="0"/>
+              <a:t>パーセプトロン、</a:t>
+            </a:r>
+            <a:r>
+              <a:rPr lang="en-US" altLang="ja-JP" dirty="0"/>
+              <a:t>CNN</a:t>
+            </a:r>
+            <a:r>
+              <a:rPr lang="ja-JP" altLang="en-US" dirty="0" err="1"/>
+              <a:t>、</a:t>
+            </a:r>
+            <a:r>
+              <a:rPr lang="en-US" altLang="ja-JP" dirty="0"/>
+              <a:t>RNN</a:t>
+            </a:r>
+            <a:r>
+              <a:rPr lang="ja-JP" altLang="en-US" dirty="0"/>
+              <a:t>など</a:t>
+            </a:r>
+            <a:endParaRPr lang="en-US" altLang="ja-JP" dirty="0"/>
+          </a:p>
+          <a:p>
+            <a:pPr lvl="1"/>
+            <a:r>
+              <a:rPr kumimoji="1" lang="en-US" altLang="ja-JP" dirty="0"/>
+              <a:t>K</a:t>
+            </a:r>
+            <a:r>
+              <a:rPr kumimoji="1" lang="ja-JP" altLang="en-US" dirty="0"/>
+              <a:t>近傍法</a:t>
+            </a:r>
+            <a:r>
+              <a:rPr lang="en-US" altLang="ja-JP" dirty="0"/>
+              <a:t>			</a:t>
+            </a:r>
+            <a:r>
+              <a:rPr lang="en-US" altLang="ja-JP" dirty="0" err="1"/>
+              <a:t>KNeighborsClassifier</a:t>
+            </a:r>
+            <a:endParaRPr lang="en-US" altLang="ja-JP" dirty="0"/>
+          </a:p>
+          <a:p>
+            <a:pPr marL="274320" lvl="1" indent="0">
+              <a:buNone/>
+            </a:pPr>
+            <a:endParaRPr lang="en-US" altLang="ja-JP" dirty="0"/>
+          </a:p>
+          <a:p>
+            <a:pPr marL="0" indent="0">
+              <a:buNone/>
+            </a:pPr>
+            <a:r>
+              <a:rPr kumimoji="1" lang="en-US" altLang="ja-JP" sz="1800" dirty="0"/>
+              <a:t>※</a:t>
+            </a:r>
+            <a:r>
+              <a:rPr kumimoji="1" lang="ja-JP" altLang="en-US" sz="1800" dirty="0"/>
+              <a:t> </a:t>
+            </a:r>
+            <a:r>
+              <a:rPr kumimoji="1" lang="en-US" altLang="ja-JP" sz="1800" dirty="0"/>
+              <a:t>TensorFlow/</a:t>
+            </a:r>
+            <a:r>
+              <a:rPr kumimoji="1" lang="en-US" altLang="ja-JP" sz="1800" dirty="0" err="1"/>
+              <a:t>Keras</a:t>
+            </a:r>
+            <a:r>
+              <a:rPr kumimoji="1" lang="en-US" altLang="ja-JP" sz="1800" dirty="0"/>
+              <a:t> </a:t>
+            </a:r>
+            <a:r>
+              <a:rPr kumimoji="1" lang="ja-JP" altLang="en-US" sz="1800" dirty="0"/>
+              <a:t>のみ</a:t>
+            </a:r>
+            <a:endParaRPr kumimoji="1" lang="en-US" altLang="ja-JP" sz="1800" dirty="0"/>
+          </a:p>
+          <a:p>
+            <a:pPr lvl="1"/>
+            <a:endParaRPr lang="en-US" altLang="ja-JP" dirty="0"/>
           </a:p>
         </p:txBody>
       </p:sp>
@@ -8722,83 +8795,10 @@
           </a:p>
         </p:txBody>
       </p:sp>
-      <p:sp>
-        <p:nvSpPr>
-          <p:cNvPr id="3" name="テキスト ボックス 2">
-            <a:extLst>
-              <a:ext uri="{FF2B5EF4-FFF2-40B4-BE49-F238E27FC236}">
-                <a16:creationId xmlns:a16="http://schemas.microsoft.com/office/drawing/2014/main" id="{667B49C2-E67A-42DD-A915-D509CF0C8C99}"/>
-              </a:ext>
-            </a:extLst>
-          </p:cNvPr>
-          <p:cNvSpPr txBox="1"/>
-          <p:nvPr/>
-        </p:nvSpPr>
-        <p:spPr>
-          <a:xfrm>
-            <a:off x="755576" y="1568355"/>
-            <a:ext cx="2214315" cy="1759900"/>
-          </a:xfrm>
-          <a:prstGeom prst="rect">
-            <a:avLst/>
-          </a:prstGeom>
-          <a:noFill/>
-        </p:spPr>
-        <p:txBody>
-          <a:bodyPr wrap="none" lIns="36000" tIns="0" rIns="36000" bIns="36000" rtlCol="0">
-            <a:spAutoFit/>
-          </a:bodyPr>
-          <a:lstStyle/>
-          <a:p>
-            <a:pPr marL="342900" indent="-342900">
-              <a:buFont typeface="+mj-lt"/>
-              <a:buAutoNum type="arabicPeriod"/>
-            </a:pPr>
-            <a:r>
-              <a:rPr lang="ja-JP" altLang="en-US" sz="2800" dirty="0"/>
-              <a:t>考え方</a:t>
-            </a:r>
-            <a:endParaRPr lang="en-US" altLang="ja-JP" sz="2800" dirty="0"/>
-          </a:p>
-          <a:p>
-            <a:pPr marL="342900" indent="-342900">
-              <a:buFont typeface="+mj-lt"/>
-              <a:buAutoNum type="arabicPeriod"/>
-            </a:pPr>
-            <a:r>
-              <a:rPr kumimoji="1" lang="ja-JP" altLang="en-US" sz="2800" dirty="0"/>
-              <a:t>目的関数</a:t>
-            </a:r>
-            <a:endParaRPr kumimoji="1" lang="en-US" altLang="ja-JP" sz="2800" dirty="0"/>
-          </a:p>
-          <a:p>
-            <a:pPr marL="342900" indent="-342900">
-              <a:buFont typeface="+mj-lt"/>
-              <a:buAutoNum type="arabicPeriod"/>
-            </a:pPr>
-            <a:r>
-              <a:rPr lang="ja-JP" altLang="en-US" sz="2800" dirty="0"/>
-              <a:t>最急降下法</a:t>
-            </a:r>
-            <a:endParaRPr lang="en-US" altLang="ja-JP" sz="2800" dirty="0"/>
-          </a:p>
-          <a:p>
-            <a:pPr marL="342900" indent="-342900">
-              <a:buFont typeface="+mj-lt"/>
-              <a:buAutoNum type="arabicPeriod"/>
-            </a:pPr>
-            <a:r>
-              <a:rPr lang="ja-JP" altLang="en-US" sz="2800" dirty="0"/>
-              <a:t>コスト関数</a:t>
-            </a:r>
-            <a:endParaRPr kumimoji="1" lang="ja-JP" altLang="en-US" sz="2800" dirty="0"/>
-          </a:p>
-        </p:txBody>
-      </p:sp>
     </p:spTree>
     <p:extLst>
       <p:ext uri="{BB962C8B-B14F-4D97-AF65-F5344CB8AC3E}">
-        <p14:creationId xmlns:p14="http://schemas.microsoft.com/office/powerpoint/2010/main" val="3303200950"/>
+        <p14:creationId xmlns:p14="http://schemas.microsoft.com/office/powerpoint/2010/main" val="1627899226"/>
       </p:ext>
     </p:extLst>
   </p:cSld>

</xml_diff>